<commit_message>
Update web3 and pp
</commit_message>
<xml_diff>
--- a/SE334-Programming Paradigms/Slides/2. Type-Type class.pptx
+++ b/SE334-Programming Paradigms/Slides/2. Type-Type class.pptx
@@ -3867,8 +3867,8 @@
           </a:p>
         </p:txBody>
       </p:sp>
-      <mc:AlternateContent xmlns:mc="http://schemas.openxmlformats.org/markup-compatibility/2006">
-        <mc:Choice xmlns:a14="http://schemas.microsoft.com/office/drawing/2010/main" Requires="a14">
+      <mc:AlternateContent xmlns:mc="http://schemas.openxmlformats.org/markup-compatibility/2006" xmlns:a14="http://schemas.microsoft.com/office/drawing/2010/main">
+        <mc:Choice Requires="a14">
           <p:sp>
             <p:nvSpPr>
               <p:cNvPr id="4" name="AutoShape 2" descr="Hình 1.0.1. Logo Haskell, lấy cảm hứng từ Monad &gt;&gt;= (một khái niệm trừu tượng trong Haskell) và Lambda $\lambda$ (chữ cái Hy Lạp)">
@@ -4074,7 +4074,7 @@
             </p:txBody>
           </p:sp>
         </mc:Choice>
-        <mc:Fallback>
+        <mc:Fallback xmlns="">
           <p:sp>
             <p:nvSpPr>
               <p:cNvPr id="4" name="AutoShape 2" descr="Hình 1.0.1. Logo Haskell, lấy cảm hứng từ Monad &gt;&gt;= (một khái niệm trừu tượng trong Haskell) và Lambda $\lambda$ (chữ cái Hy Lạp)">

</xml_diff>